<commit_message>
Little update of presentation
</commit_message>
<xml_diff>
--- a/Project 84.pptx
+++ b/Project 84.pptx
@@ -6,7 +6,6 @@
   </p:sldMasterIdLst>
   <p:sldIdLst>
     <p:sldId id="256" r:id="rId2"/>
-    <p:sldId id="257" r:id="rId3"/>
   </p:sldIdLst>
   <p:sldSz cx="12192000" cy="6858000"/>
   <p:notesSz cx="6858000" cy="9144000"/>
@@ -5830,6 +5829,71 @@
           <a:chExt cx="0" cy="0"/>
         </a:xfrm>
       </p:grpSpPr>
+      <p:sp>
+        <p:nvSpPr>
+          <p:cNvPr id="2" name="TextovéPole 1"/>
+          <p:cNvSpPr txBox="1"/>
+          <p:nvPr/>
+        </p:nvSpPr>
+        <p:spPr>
+          <a:xfrm>
+            <a:off x="0" y="1107583"/>
+            <a:ext cx="12192000" cy="646331"/>
+          </a:xfrm>
+          <a:prstGeom prst="rect">
+            <a:avLst/>
+          </a:prstGeom>
+          <a:noFill/>
+        </p:spPr>
+        <p:txBody>
+          <a:bodyPr wrap="square" rtlCol="0">
+            <a:spAutoFit/>
+          </a:bodyPr>
+          <a:lstStyle/>
+          <a:p>
+            <a:pPr algn="ctr"/>
+            <a:r>
+              <a:rPr lang="cs-CZ" sz="3600" dirty="0" err="1" smtClean="0">
+                <a:latin typeface="Times New Roman" panose="02020603050405020304" pitchFamily="18" charset="0"/>
+                <a:cs typeface="Times New Roman" panose="02020603050405020304" pitchFamily="18" charset="0"/>
+              </a:rPr>
+              <a:t>Cities</a:t>
+            </a:r>
+            <a:r>
+              <a:rPr lang="cs-CZ" sz="3600" dirty="0" smtClean="0">
+                <a:latin typeface="Times New Roman" panose="02020603050405020304" pitchFamily="18" charset="0"/>
+                <a:cs typeface="Times New Roman" panose="02020603050405020304" pitchFamily="18" charset="0"/>
+              </a:rPr>
+              <a:t> </a:t>
+            </a:r>
+            <a:r>
+              <a:rPr lang="cs-CZ" sz="3600" dirty="0" err="1" smtClean="0">
+                <a:latin typeface="Times New Roman" panose="02020603050405020304" pitchFamily="18" charset="0"/>
+                <a:cs typeface="Times New Roman" panose="02020603050405020304" pitchFamily="18" charset="0"/>
+              </a:rPr>
+              <a:t>of</a:t>
+            </a:r>
+            <a:r>
+              <a:rPr lang="cs-CZ" sz="3600" dirty="0" smtClean="0">
+                <a:latin typeface="Times New Roman" panose="02020603050405020304" pitchFamily="18" charset="0"/>
+                <a:cs typeface="Times New Roman" panose="02020603050405020304" pitchFamily="18" charset="0"/>
+              </a:rPr>
+              <a:t> </a:t>
+            </a:r>
+            <a:r>
+              <a:rPr lang="cs-CZ" sz="3600" dirty="0" err="1" smtClean="0">
+                <a:latin typeface="Times New Roman" panose="02020603050405020304" pitchFamily="18" charset="0"/>
+                <a:cs typeface="Times New Roman" panose="02020603050405020304" pitchFamily="18" charset="0"/>
+              </a:rPr>
+              <a:t>Beacons</a:t>
+            </a:r>
+            <a:endParaRPr lang="cs-CZ" sz="3600" dirty="0">
+              <a:latin typeface="Times New Roman" panose="02020603050405020304" pitchFamily="18" charset="0"/>
+              <a:cs typeface="Times New Roman" panose="02020603050405020304" pitchFamily="18" charset="0"/>
+            </a:endParaRPr>
+          </a:p>
+        </p:txBody>
+      </p:sp>
     </p:spTree>
     <p:extLst>
       <p:ext uri="{BB962C8B-B14F-4D97-AF65-F5344CB8AC3E}">
@@ -5840,94 +5904,15 @@
   <p:clrMapOvr>
     <a:masterClrMapping/>
   </p:clrMapOvr>
-  <mc:AlternateContent xmlns:mc="http://schemas.openxmlformats.org/markup-compatibility/2006">
-    <mc:Choice xmlns:p14="http://schemas.microsoft.com/office/powerpoint/2010/main" Requires="p14">
+  <mc:AlternateContent xmlns:mc="http://schemas.openxmlformats.org/markup-compatibility/2006" xmlns:p14="http://schemas.microsoft.com/office/powerpoint/2010/main">
+    <mc:Choice Requires="p14">
       <p:transition p14:dur="100">
         <p:cut/>
       </p:transition>
     </mc:Choice>
-    <mc:Fallback>
+    <mc:Fallback xmlns="">
       <p:transition>
         <p:cut/>
-      </p:transition>
-    </mc:Fallback>
-  </mc:AlternateContent>
-  <p:timing>
-    <p:tnLst>
-      <p:par>
-        <p:cTn id="1" dur="indefinite" restart="never" nodeType="tmRoot"/>
-      </p:par>
-    </p:tnLst>
-  </p:timing>
-</p:sld>
-</file>
-
-<file path=ppt/slides/slide2.xml><?xml version="1.0" encoding="utf-8"?>
-<p:sld xmlns:a="http://schemas.openxmlformats.org/drawingml/2006/main" xmlns:r="http://schemas.openxmlformats.org/officeDocument/2006/relationships" xmlns:p="http://schemas.openxmlformats.org/presentationml/2006/main">
-  <p:cSld>
-    <p:spTree>
-      <p:nvGrpSpPr>
-        <p:cNvPr id="1" name=""/>
-        <p:cNvGrpSpPr/>
-        <p:nvPr/>
-      </p:nvGrpSpPr>
-      <p:grpSpPr>
-        <a:xfrm>
-          <a:off x="0" y="0"/>
-          <a:ext cx="0" cy="0"/>
-          <a:chOff x="0" y="0"/>
-          <a:chExt cx="0" cy="0"/>
-        </a:xfrm>
-      </p:grpSpPr>
-      <p:pic>
-        <p:nvPicPr>
-          <p:cNvPr id="2" name="Obrázek 1"/>
-          <p:cNvPicPr>
-            <a:picLocks noChangeAspect="1"/>
-          </p:cNvPicPr>
-          <p:nvPr/>
-        </p:nvPicPr>
-        <p:blipFill>
-          <a:blip r:embed="rId2">
-            <a:extLst>
-              <a:ext uri="{28A0092B-C50C-407E-A947-70E740481C1C}">
-                <a14:useLocalDpi xmlns:a14="http://schemas.microsoft.com/office/drawing/2010/main" val="0"/>
-              </a:ext>
-            </a:extLst>
-          </a:blip>
-          <a:stretch>
-            <a:fillRect/>
-          </a:stretch>
-        </p:blipFill>
-        <p:spPr>
-          <a:xfrm>
-            <a:off x="575667" y="0"/>
-            <a:ext cx="11139840" cy="6858000"/>
-          </a:xfrm>
-          <a:prstGeom prst="rect">
-            <a:avLst/>
-          </a:prstGeom>
-        </p:spPr>
-      </p:pic>
-    </p:spTree>
-    <p:extLst>
-      <p:ext uri="{BB962C8B-B14F-4D97-AF65-F5344CB8AC3E}">
-        <p14:creationId xmlns:p14="http://schemas.microsoft.com/office/powerpoint/2010/main" val="4237393266"/>
-      </p:ext>
-    </p:extLst>
-  </p:cSld>
-  <p:clrMapOvr>
-    <a:masterClrMapping/>
-  </p:clrMapOvr>
-  <mc:AlternateContent xmlns:mc="http://schemas.openxmlformats.org/markup-compatibility/2006">
-    <mc:Choice xmlns:p14="http://schemas.microsoft.com/office/powerpoint/2010/main" Requires="p14">
-      <p:transition p14:dur="400">
-        <p:fade/>
-      </p:transition>
-    </mc:Choice>
-    <mc:Fallback>
-      <p:transition>
-        <p:fade/>
       </p:transition>
     </mc:Fallback>
   </mc:AlternateContent>

</xml_diff>